<commit_message>
feat: sistema de colaboração, certificados digitais e melhorias UX
- Sistema completo de colaboração em eventos (solicitação, aprovação, notificações)
- Módulo de certificação digital com geração e verificação de PDF
- Scroll automático ao trocar páginas e melhorias de navegação
- Cookie para lembrar email de login
- Organizadores podem se inscrever em eventos
- Botão colaborador em eventos públicos
- Ajustes de responsividade e correções gerais
</commit_message>
<xml_diff>
--- a/Certificacao/templates/ModeloExemplo.pptx
+++ b/Certificacao/templates/ModeloExemplo.pptx
@@ -60,24 +60,25 @@
             <a:noAutofit/>
           </a:bodyPr>
           <a:p>
+            <a:pPr algn="ctr"/>
             <a:r>
-              <a:rPr b="0" lang="pt-BR" sz="1800" strike="noStrike" u="none">
-                <a:solidFill>
-                  <a:schemeClr val="dk1"/>
-                </a:solidFill>
-                <a:effectLst/>
-                <a:uFillTx/>
-                <a:latin typeface="Calibri"/>
+              <a:rPr b="0" lang="pt-BR" sz="4400" strike="noStrike" u="none">
+                <a:solidFill>
+                  <a:srgbClr val="000000"/>
+                </a:solidFill>
+                <a:effectLst/>
+                <a:uFillTx/>
+                <a:latin typeface="Arial"/>
               </a:rPr>
               <a:t>Clique para mover o slide</a:t>
             </a:r>
-            <a:endParaRPr b="0" lang="pt-BR" sz="1800" strike="noStrike" u="none">
-              <a:solidFill>
-                <a:schemeClr val="dk1"/>
-              </a:solidFill>
-              <a:effectLst/>
-              <a:uFillTx/>
-              <a:latin typeface="Calibri"/>
+            <a:endParaRPr b="0" lang="pt-BR" sz="4400" strike="noStrike" u="none">
+              <a:solidFill>
+                <a:srgbClr val="000000"/>
+              </a:solidFill>
+              <a:effectLst/>
+              <a:uFillTx/>
+              <a:latin typeface="Arial"/>
             </a:endParaRPr>
           </a:p>
         </p:txBody>
@@ -364,7 +365,7 @@
             <a:pPr indent="0" algn="r">
               <a:buNone/>
             </a:pPr>
-            <a:fld id="{C135A79C-5E7D-4E11-825A-967F02ABC144}" type="slidenum">
+            <a:fld id="{5D0DD5BC-4CD4-4E6B-A882-6B139C91277A}" type="slidenum">
               <a:rPr b="0" lang="pt-BR" sz="1400" strike="noStrike" u="none">
                 <a:solidFill>
                   <a:srgbClr val="000000"/>
@@ -411,7 +412,7 @@
       </p:grpSpPr>
       <p:sp>
         <p:nvSpPr>
-          <p:cNvPr id="19" name="PlaceHolder 1"/>
+          <p:cNvPr id="18" name="PlaceHolder 1"/>
           <p:cNvSpPr>
             <a:spLocks noGrp="1"/>
           </p:cNvSpPr>
@@ -422,7 +423,7 @@
         <p:spPr>
           <a:xfrm>
             <a:off x="685800" y="1143000"/>
-            <a:ext cx="5486040" cy="3085920"/>
+            <a:ext cx="5485320" cy="3085200"/>
           </a:xfrm>
           <a:prstGeom prst="rect">
             <a:avLst/>
@@ -434,7 +435,7 @@
       </p:sp>
       <p:sp>
         <p:nvSpPr>
-          <p:cNvPr id="20" name="PlaceHolder 2"/>
+          <p:cNvPr id="19" name="PlaceHolder 2"/>
           <p:cNvSpPr>
             <a:spLocks noGrp="1"/>
           </p:cNvSpPr>
@@ -445,7 +446,7 @@
         <p:spPr>
           <a:xfrm>
             <a:off x="685800" y="4400640"/>
-            <a:ext cx="5486040" cy="3600000"/>
+            <a:ext cx="5485320" cy="3599280"/>
           </a:xfrm>
           <a:prstGeom prst="rect">
             <a:avLst/>
@@ -476,7 +477,7 @@
       </p:sp>
       <p:sp>
         <p:nvSpPr>
-          <p:cNvPr id="21" name="PlaceHolder 3"/>
+          <p:cNvPr id="20" name="PlaceHolder 3"/>
           <p:cNvSpPr>
             <a:spLocks noGrp="1"/>
           </p:cNvSpPr>
@@ -487,7 +488,7 @@
         <p:spPr>
           <a:xfrm>
             <a:off x="3884760" y="8685360"/>
-            <a:ext cx="2971440" cy="458280"/>
+            <a:ext cx="2970720" cy="457560"/>
           </a:xfrm>
           <a:prstGeom prst="rect">
             <a:avLst/>
@@ -507,6 +508,9 @@
                 <a:spcPct val="100000"/>
               </a:lnSpc>
               <a:buNone/>
+              <a:tabLst>
+                <a:tab algn="l" pos="0"/>
+              </a:tabLst>
               <a:defRPr b="0" lang="en-US" sz="1200" strike="noStrike" u="none">
                 <a:solidFill>
                   <a:schemeClr val="dk1"/>
@@ -524,8 +528,11 @@
                 <a:spcPct val="100000"/>
               </a:lnSpc>
               <a:buNone/>
-            </a:pPr>
-            <a:fld id="{3544AB98-9AF4-4AE7-9FD9-2F39A619E06A}" type="slidenum">
+              <a:tabLst>
+                <a:tab algn="l" pos="0"/>
+              </a:tabLst>
+            </a:pPr>
+            <a:fld id="{6A5E3A6A-04C7-4CB3-A4B2-7879EBC2CCC1}" type="slidenum">
               <a:rPr b="0" lang="en-US" sz="1200" strike="noStrike" u="none">
                 <a:solidFill>
                   <a:schemeClr val="dk1"/>
@@ -627,27 +634,27 @@
             <a:noAutofit/>
           </a:bodyPr>
           <a:p>
-            <a:pPr indent="0">
+            <a:pPr indent="0" algn="ctr">
               <a:buNone/>
             </a:pPr>
             <a:r>
-              <a:rPr b="0" lang="pt-BR" sz="1800" strike="noStrike" u="none">
-                <a:solidFill>
-                  <a:schemeClr val="dk1"/>
-                </a:solidFill>
-                <a:effectLst/>
-                <a:uFillTx/>
-                <a:latin typeface="Calibri"/>
+              <a:rPr b="0" lang="pt-BR" sz="4400" strike="noStrike" u="none">
+                <a:solidFill>
+                  <a:srgbClr val="000000"/>
+                </a:solidFill>
+                <a:effectLst/>
+                <a:uFillTx/>
+                <a:latin typeface="Arial"/>
               </a:rPr>
               <a:t>Clique para editar o formato do texto do título</a:t>
             </a:r>
-            <a:endParaRPr b="0" lang="pt-BR" sz="1800" strike="noStrike" u="none">
-              <a:solidFill>
-                <a:schemeClr val="dk1"/>
-              </a:solidFill>
-              <a:effectLst/>
-              <a:uFillTx/>
-              <a:latin typeface="Calibri"/>
+            <a:endParaRPr b="0" lang="pt-BR" sz="4400" strike="noStrike" u="none">
+              <a:solidFill>
+                <a:srgbClr val="000000"/>
+              </a:solidFill>
+              <a:effectLst/>
+              <a:uFillTx/>
+              <a:latin typeface="Arial"/>
             </a:endParaRPr>
           </a:p>
         </p:txBody>
@@ -677,7 +684,7 @@
         </p:spPr>
         <p:txBody>
           <a:bodyPr lIns="0" rIns="0" tIns="0" bIns="0" anchor="t">
-            <a:normAutofit/>
+            <a:normAutofit lnSpcReduction="9999"/>
           </a:bodyPr>
           <a:p>
             <a:pPr marL="432000" indent="-324000">
@@ -694,21 +701,21 @@
             <a:r>
               <a:rPr b="0" lang="pt-BR" sz="3200" strike="noStrike" u="none">
                 <a:solidFill>
-                  <a:schemeClr val="dk1"/>
-                </a:solidFill>
-                <a:effectLst/>
-                <a:uFillTx/>
-                <a:latin typeface="Calibri"/>
+                  <a:srgbClr val="000000"/>
+                </a:solidFill>
+                <a:effectLst/>
+                <a:uFillTx/>
+                <a:latin typeface="Arial"/>
               </a:rPr>
               <a:t>Clique para editar o formato de texto dos tópicos</a:t>
             </a:r>
             <a:endParaRPr b="0" lang="pt-BR" sz="3200" strike="noStrike" u="none">
               <a:solidFill>
-                <a:schemeClr val="dk1"/>
-              </a:solidFill>
-              <a:effectLst/>
-              <a:uFillTx/>
-              <a:latin typeface="Calibri"/>
+                <a:srgbClr val="000000"/>
+              </a:solidFill>
+              <a:effectLst/>
+              <a:uFillTx/>
+              <a:latin typeface="Arial"/>
             </a:endParaRPr>
           </a:p>
           <a:p>
@@ -724,23 +731,23 @@
               <a:buChar char=""/>
             </a:pPr>
             <a:r>
-              <a:rPr b="0" lang="pt-BR" sz="2400" strike="noStrike" u="none">
-                <a:solidFill>
-                  <a:schemeClr val="dk1"/>
-                </a:solidFill>
-                <a:effectLst/>
-                <a:uFillTx/>
-                <a:latin typeface="Calibri"/>
+              <a:rPr b="0" lang="pt-BR" sz="2800" strike="noStrike" u="none">
+                <a:solidFill>
+                  <a:srgbClr val="000000"/>
+                </a:solidFill>
+                <a:effectLst/>
+                <a:uFillTx/>
+                <a:latin typeface="Arial"/>
               </a:rPr>
               <a:t>2.º nível de tópicos</a:t>
             </a:r>
-            <a:endParaRPr b="0" lang="pt-BR" sz="2400" strike="noStrike" u="none">
-              <a:solidFill>
-                <a:schemeClr val="dk1"/>
-              </a:solidFill>
-              <a:effectLst/>
-              <a:uFillTx/>
-              <a:latin typeface="Calibri"/>
+            <a:endParaRPr b="0" lang="pt-BR" sz="2800" strike="noStrike" u="none">
+              <a:solidFill>
+                <a:srgbClr val="000000"/>
+              </a:solidFill>
+              <a:effectLst/>
+              <a:uFillTx/>
+              <a:latin typeface="Arial"/>
             </a:endParaRPr>
           </a:p>
           <a:p>
@@ -756,23 +763,23 @@
               <a:buChar char=""/>
             </a:pPr>
             <a:r>
-              <a:rPr b="0" lang="pt-BR" sz="2000" strike="noStrike" u="none">
-                <a:solidFill>
-                  <a:schemeClr val="dk1"/>
-                </a:solidFill>
-                <a:effectLst/>
-                <a:uFillTx/>
-                <a:latin typeface="Calibri"/>
+              <a:rPr b="0" lang="pt-BR" sz="2400" strike="noStrike" u="none">
+                <a:solidFill>
+                  <a:srgbClr val="000000"/>
+                </a:solidFill>
+                <a:effectLst/>
+                <a:uFillTx/>
+                <a:latin typeface="Arial"/>
               </a:rPr>
               <a:t>3.º nível de tópicos</a:t>
             </a:r>
-            <a:endParaRPr b="0" lang="pt-BR" sz="2000" strike="noStrike" u="none">
-              <a:solidFill>
-                <a:schemeClr val="dk1"/>
-              </a:solidFill>
-              <a:effectLst/>
-              <a:uFillTx/>
-              <a:latin typeface="Calibri"/>
+            <a:endParaRPr b="0" lang="pt-BR" sz="2400" strike="noStrike" u="none">
+              <a:solidFill>
+                <a:srgbClr val="000000"/>
+              </a:solidFill>
+              <a:effectLst/>
+              <a:uFillTx/>
+              <a:latin typeface="Arial"/>
             </a:endParaRPr>
           </a:p>
           <a:p>
@@ -790,21 +797,21 @@
             <a:r>
               <a:rPr b="0" lang="pt-BR" sz="2000" strike="noStrike" u="none">
                 <a:solidFill>
-                  <a:schemeClr val="dk1"/>
-                </a:solidFill>
-                <a:effectLst/>
-                <a:uFillTx/>
-                <a:latin typeface="Calibri"/>
+                  <a:srgbClr val="000000"/>
+                </a:solidFill>
+                <a:effectLst/>
+                <a:uFillTx/>
+                <a:latin typeface="Arial"/>
               </a:rPr>
               <a:t>4.º nível de tópicos</a:t>
             </a:r>
             <a:endParaRPr b="0" lang="pt-BR" sz="2000" strike="noStrike" u="none">
               <a:solidFill>
-                <a:schemeClr val="dk1"/>
-              </a:solidFill>
-              <a:effectLst/>
-              <a:uFillTx/>
-              <a:latin typeface="Calibri"/>
+                <a:srgbClr val="000000"/>
+              </a:solidFill>
+              <a:effectLst/>
+              <a:uFillTx/>
+              <a:latin typeface="Arial"/>
             </a:endParaRPr>
           </a:p>
           <a:p>
@@ -822,21 +829,21 @@
             <a:r>
               <a:rPr b="0" lang="pt-BR" sz="2000" strike="noStrike" u="none">
                 <a:solidFill>
-                  <a:schemeClr val="dk1"/>
-                </a:solidFill>
-                <a:effectLst/>
-                <a:uFillTx/>
-                <a:latin typeface="Calibri"/>
+                  <a:srgbClr val="000000"/>
+                </a:solidFill>
+                <a:effectLst/>
+                <a:uFillTx/>
+                <a:latin typeface="Arial"/>
               </a:rPr>
               <a:t>5.º nível de tópicos</a:t>
             </a:r>
             <a:endParaRPr b="0" lang="pt-BR" sz="2000" strike="noStrike" u="none">
               <a:solidFill>
-                <a:schemeClr val="dk1"/>
-              </a:solidFill>
-              <a:effectLst/>
-              <a:uFillTx/>
-              <a:latin typeface="Calibri"/>
+                <a:srgbClr val="000000"/>
+              </a:solidFill>
+              <a:effectLst/>
+              <a:uFillTx/>
+              <a:latin typeface="Arial"/>
             </a:endParaRPr>
           </a:p>
           <a:p>
@@ -854,21 +861,21 @@
             <a:r>
               <a:rPr b="0" lang="pt-BR" sz="2000" strike="noStrike" u="none">
                 <a:solidFill>
-                  <a:schemeClr val="dk1"/>
-                </a:solidFill>
-                <a:effectLst/>
-                <a:uFillTx/>
-                <a:latin typeface="Calibri"/>
+                  <a:srgbClr val="000000"/>
+                </a:solidFill>
+                <a:effectLst/>
+                <a:uFillTx/>
+                <a:latin typeface="Arial"/>
               </a:rPr>
               <a:t>6.º nível de tópicos</a:t>
             </a:r>
             <a:endParaRPr b="0" lang="pt-BR" sz="2000" strike="noStrike" u="none">
               <a:solidFill>
-                <a:schemeClr val="dk1"/>
-              </a:solidFill>
-              <a:effectLst/>
-              <a:uFillTx/>
-              <a:latin typeface="Calibri"/>
+                <a:srgbClr val="000000"/>
+              </a:solidFill>
+              <a:effectLst/>
+              <a:uFillTx/>
+              <a:latin typeface="Arial"/>
             </a:endParaRPr>
           </a:p>
           <a:p>
@@ -886,21 +893,21 @@
             <a:r>
               <a:rPr b="0" lang="pt-BR" sz="2000" strike="noStrike" u="none">
                 <a:solidFill>
-                  <a:schemeClr val="dk1"/>
-                </a:solidFill>
-                <a:effectLst/>
-                <a:uFillTx/>
-                <a:latin typeface="Calibri"/>
+                  <a:srgbClr val="000000"/>
+                </a:solidFill>
+                <a:effectLst/>
+                <a:uFillTx/>
+                <a:latin typeface="Arial"/>
               </a:rPr>
               <a:t>7.º nível de tópicos</a:t>
             </a:r>
             <a:endParaRPr b="0" lang="pt-BR" sz="2000" strike="noStrike" u="none">
               <a:solidFill>
-                <a:schemeClr val="dk1"/>
-              </a:solidFill>
-              <a:effectLst/>
-              <a:uFillTx/>
-              <a:latin typeface="Calibri"/>
+                <a:srgbClr val="000000"/>
+              </a:solidFill>
+              <a:effectLst/>
+              <a:uFillTx/>
+              <a:latin typeface="Arial"/>
             </a:endParaRPr>
           </a:p>
         </p:txBody>
@@ -951,7 +958,7 @@
         <p:spPr>
           <a:xfrm>
             <a:off x="1085760" y="609480"/>
-            <a:ext cx="6972120" cy="3924000"/>
+            <a:ext cx="6971400" cy="3923280"/>
           </a:xfrm>
           <a:prstGeom prst="rect">
             <a:avLst/>
@@ -974,8 +981,8 @@
         </p:blipFill>
         <p:spPr>
           <a:xfrm>
-            <a:off x="-966960" y="-1114560"/>
-            <a:ext cx="3303360" cy="2229480"/>
+            <a:off x="-210960" y="-394560"/>
+            <a:ext cx="3302640" cy="2228760"/>
           </a:xfrm>
           <a:prstGeom prst="rect">
             <a:avLst/>
@@ -998,8 +1005,8 @@
         </p:blipFill>
         <p:spPr>
           <a:xfrm>
-            <a:off x="-942840" y="-976320"/>
-            <a:ext cx="3280320" cy="2089080"/>
+            <a:off x="-186840" y="-256320"/>
+            <a:ext cx="3279600" cy="2088360"/>
           </a:xfrm>
           <a:prstGeom prst="rect">
             <a:avLst/>
@@ -1022,8 +1029,8 @@
         </p:blipFill>
         <p:spPr>
           <a:xfrm>
-            <a:off x="9767160" y="6420960"/>
-            <a:ext cx="3303360" cy="2229480"/>
+            <a:off x="6023160" y="3218040"/>
+            <a:ext cx="3302640" cy="2228760"/>
           </a:xfrm>
           <a:prstGeom prst="rect">
             <a:avLst/>
@@ -1046,8 +1053,8 @@
         </p:blipFill>
         <p:spPr>
           <a:xfrm>
-            <a:off x="9743400" y="6282720"/>
-            <a:ext cx="3280320" cy="2089080"/>
+            <a:off x="5999400" y="3079800"/>
+            <a:ext cx="3279600" cy="2088360"/>
           </a:xfrm>
           <a:prstGeom prst="rect">
             <a:avLst/>
@@ -1060,7 +1067,7 @@
       </p:pic>
       <p:pic>
         <p:nvPicPr>
-          <p:cNvPr id="13" name="Object 6" descr="preencoded.png"/>
+          <p:cNvPr id="13" name="Object 7" descr="preencoded.png"/>
           <p:cNvPicPr/>
           <p:nvPr/>
         </p:nvPicPr>
@@ -1070,32 +1077,8 @@
         </p:blipFill>
         <p:spPr>
           <a:xfrm>
-            <a:off x="3790800" y="3762360"/>
-            <a:ext cx="1547280" cy="771120"/>
-          </a:xfrm>
-          <a:prstGeom prst="rect">
-            <a:avLst/>
-          </a:prstGeom>
-          <a:noFill/>
-          <a:ln w="0">
-            <a:noFill/>
-          </a:ln>
-        </p:spPr>
-      </p:pic>
-      <p:pic>
-        <p:nvPicPr>
-          <p:cNvPr id="14" name="Object 7" descr="preencoded.png"/>
-          <p:cNvPicPr/>
-          <p:nvPr/>
-        </p:nvPicPr>
-        <p:blipFill>
-          <a:blip r:embed="rId7"/>
-          <a:stretch/>
-        </p:blipFill>
-        <p:spPr>
-          <a:xfrm>
-            <a:off x="2852640" y="395280"/>
-            <a:ext cx="3433320" cy="428400"/>
+            <a:off x="2852640" y="503280"/>
+            <a:ext cx="3432600" cy="427680"/>
           </a:xfrm>
           <a:prstGeom prst="rect">
             <a:avLst/>
@@ -1108,14 +1091,14 @@
       </p:pic>
       <p:sp>
         <p:nvSpPr>
-          <p:cNvPr id="15" name="Object8"/>
+          <p:cNvPr id="14" name="Object8"/>
           <p:cNvSpPr/>
           <p:nvPr/>
         </p:nvSpPr>
         <p:spPr>
           <a:xfrm>
-            <a:off x="1509840" y="1681200"/>
-            <a:ext cx="6271920" cy="811080"/>
+            <a:off x="1509840" y="1357200"/>
+            <a:ext cx="6271200" cy="810360"/>
           </a:xfrm>
           <a:prstGeom prst="rect">
             <a:avLst/>
@@ -1148,11 +1131,11 @@
                 </a:solidFill>
                 <a:effectLst/>
                 <a:uFillTx/>
-                <a:latin typeface="Unknown"/>
+                <a:latin typeface="Inter"/>
                 <a:ea typeface="Unknown"/>
               </a:rPr>
               <a:t>Certificamos que {NomeParticipante}, -participou do(a) {NomeEvento}, evento organizado por {NomeOrganizador}, realizado no {LocalEvento} no dia {Data}, com carga horária de {CargaHoraria}.</a:t>
+ CPF {CPF}, participou do(a) {NomeEvento}, evento organizado por {NomeOrganizador}, realizado no {LocalEvento} no dia {Data}, com carga horária de {CargaHoraria}.</a:t>
             </a:r>
             <a:endParaRPr b="0" lang="pt-BR" sz="1000" strike="noStrike" u="none">
               <a:solidFill>
@@ -1160,21 +1143,21 @@
               </a:solidFill>
               <a:effectLst/>
               <a:uFillTx/>
-              <a:latin typeface="Arial"/>
+              <a:latin typeface="Inter"/>
             </a:endParaRPr>
           </a:p>
         </p:txBody>
       </p:sp>
       <p:sp>
         <p:nvSpPr>
-          <p:cNvPr id="16" name="Object9"/>
+          <p:cNvPr id="15" name="Object9"/>
           <p:cNvSpPr/>
           <p:nvPr/>
         </p:nvSpPr>
         <p:spPr>
           <a:xfrm>
-            <a:off x="4038480" y="3133800"/>
-            <a:ext cx="1204560" cy="270000"/>
+            <a:off x="4038480" y="2665800"/>
+            <a:ext cx="1203840" cy="269280"/>
           </a:xfrm>
           <a:prstGeom prst="rect">
             <a:avLst/>
@@ -1218,21 +1201,21 @@
               </a:solidFill>
               <a:effectLst/>
               <a:uFillTx/>
-              <a:latin typeface="Arial"/>
+              <a:latin typeface="Inter"/>
             </a:endParaRPr>
           </a:p>
         </p:txBody>
       </p:sp>
       <p:sp>
         <p:nvSpPr>
-          <p:cNvPr id="17" name="Object10"/>
+          <p:cNvPr id="16" name="Object10"/>
           <p:cNvSpPr/>
           <p:nvPr/>
         </p:nvSpPr>
         <p:spPr>
           <a:xfrm>
-            <a:off x="2357280" y="3448080"/>
-            <a:ext cx="4581000" cy="270000"/>
+            <a:off x="2357280" y="2908080"/>
+            <a:ext cx="4580280" cy="269280"/>
           </a:xfrm>
           <a:prstGeom prst="rect">
             <a:avLst/>
@@ -1276,7 +1259,7 @@
               </a:solidFill>
               <a:effectLst/>
               <a:uFillTx/>
-              <a:latin typeface="Arial"/>
+              <a:latin typeface="Inter"/>
             </a:endParaRPr>
           </a:p>
           <a:p>
@@ -1295,7 +1278,7 @@
                 <a:latin typeface="Inter"/>
                 <a:ea typeface="Inter"/>
               </a:rPr>
-              <a:t>Sua autenticidade pode ser verificada por meio do código {CodigoAutenticador} em [domínio do site].</a:t>
+              <a:t>Sua autenticidade pode ser verificada por meio do código {CodigoAutenticador} em ceu/certificacao/verificarcertificacao.php.</a:t>
             </a:r>
             <a:endParaRPr b="0" lang="pt-BR" sz="500" strike="noStrike" u="none">
               <a:solidFill>
@@ -1303,25 +1286,25 @@
               </a:solidFill>
               <a:effectLst/>
               <a:uFillTx/>
-              <a:latin typeface="Arial"/>
+              <a:latin typeface="Inter"/>
             </a:endParaRPr>
           </a:p>
         </p:txBody>
       </p:sp>
       <p:pic>
         <p:nvPicPr>
-          <p:cNvPr id="18" name="Object 11" descr="preencoded.png"/>
+          <p:cNvPr id="17" name="" descr=""/>
           <p:cNvPicPr/>
           <p:nvPr/>
         </p:nvPicPr>
         <p:blipFill>
-          <a:blip r:embed="rId8"/>
+          <a:blip r:embed="rId7"/>
           <a:stretch/>
         </p:blipFill>
         <p:spPr>
           <a:xfrm>
-            <a:off x="3857760" y="4648320"/>
-            <a:ext cx="1428480" cy="414000"/>
+            <a:off x="4212000" y="3420000"/>
+            <a:ext cx="720000" cy="720000"/>
           </a:xfrm>
           <a:prstGeom prst="rect">
             <a:avLst/>

</xml_diff>